<commit_message>
Major work completed on PowerPoint
</commit_message>
<xml_diff>
--- a/Presentation/Project_Presentation.pptx
+++ b/Presentation/Project_Presentation.pptx
@@ -7,10 +7,16 @@
   <p:sldIdLst>
     <p:sldId id="256" r:id="rId2"/>
     <p:sldId id="257" r:id="rId3"/>
-    <p:sldId id="258" r:id="rId4"/>
-    <p:sldId id="259" r:id="rId5"/>
-    <p:sldId id="260" r:id="rId6"/>
-    <p:sldId id="261" r:id="rId7"/>
+    <p:sldId id="265" r:id="rId4"/>
+    <p:sldId id="266" r:id="rId5"/>
+    <p:sldId id="258" r:id="rId6"/>
+    <p:sldId id="264" r:id="rId7"/>
+    <p:sldId id="259" r:id="rId8"/>
+    <p:sldId id="262" r:id="rId9"/>
+    <p:sldId id="263" r:id="rId10"/>
+    <p:sldId id="267" r:id="rId11"/>
+    <p:sldId id="260" r:id="rId12"/>
+    <p:sldId id="261" r:id="rId13"/>
   </p:sldIdLst>
   <p:sldSz cx="12192000" cy="6858000"/>
   <p:notesSz cx="6858000" cy="9144000"/>
@@ -109,6 +115,11 @@
       </a:defRPr>
     </a:lvl9pPr>
   </p:defaultTextStyle>
+  <p:extLst>
+    <p:ext uri="{EFAFB233-063F-42B5-8137-9DF3F51BA10A}">
+      <p15:sldGuideLst xmlns:p15="http://schemas.microsoft.com/office/powerpoint/2012/main"/>
+    </p:ext>
+  </p:extLst>
 </p:presentation>
 </file>
 
@@ -282,7 +293,7 @@
           <a:p>
             <a:fld id="{02AC24A9-CCB6-4F8D-B8DB-C2F3692CFA5A}" type="datetimeFigureOut">
               <a:rPr lang="en-US" smtClean="0"/>
-              <a:t>4/29/2020</a:t>
+              <a:t>5/6/2020</a:t>
             </a:fld>
             <a:endParaRPr lang="en-US" dirty="0"/>
           </a:p>
@@ -549,7 +560,7 @@
           <a:p>
             <a:fld id="{02AC24A9-CCB6-4F8D-B8DB-C2F3692CFA5A}" type="datetimeFigureOut">
               <a:rPr lang="en-US" smtClean="0"/>
-              <a:t>4/29/2020</a:t>
+              <a:t>5/6/2020</a:t>
             </a:fld>
             <a:endParaRPr lang="en-US"/>
           </a:p>
@@ -780,7 +791,7 @@
           <a:p>
             <a:fld id="{02AC24A9-CCB6-4F8D-B8DB-C2F3692CFA5A}" type="datetimeFigureOut">
               <a:rPr lang="en-US" smtClean="0"/>
-              <a:t>4/29/2020</a:t>
+              <a:t>5/6/2020</a:t>
             </a:fld>
             <a:endParaRPr lang="en-US"/>
           </a:p>
@@ -1090,7 +1101,7 @@
           <a:p>
             <a:fld id="{02AC24A9-CCB6-4F8D-B8DB-C2F3692CFA5A}" type="datetimeFigureOut">
               <a:rPr lang="en-US" smtClean="0"/>
-              <a:t>4/29/2020</a:t>
+              <a:t>5/6/2020</a:t>
             </a:fld>
             <a:endParaRPr lang="en-US"/>
           </a:p>
@@ -1563,7 +1574,7 @@
           <a:p>
             <a:fld id="{02AC24A9-CCB6-4F8D-B8DB-C2F3692CFA5A}" type="datetimeFigureOut">
               <a:rPr lang="en-US" smtClean="0"/>
-              <a:t>4/29/2020</a:t>
+              <a:t>5/6/2020</a:t>
             </a:fld>
             <a:endParaRPr lang="en-US"/>
           </a:p>
@@ -2110,7 +2121,7 @@
           <a:p>
             <a:fld id="{02AC24A9-CCB6-4F8D-B8DB-C2F3692CFA5A}" type="datetimeFigureOut">
               <a:rPr lang="en-US" smtClean="0"/>
-              <a:t>4/29/2020</a:t>
+              <a:t>5/6/2020</a:t>
             </a:fld>
             <a:endParaRPr lang="en-US"/>
           </a:p>
@@ -2884,7 +2895,7 @@
           <a:p>
             <a:fld id="{02AC24A9-CCB6-4F8D-B8DB-C2F3692CFA5A}" type="datetimeFigureOut">
               <a:rPr lang="en-US" smtClean="0"/>
-              <a:t>4/29/2020</a:t>
+              <a:t>5/6/2020</a:t>
             </a:fld>
             <a:endParaRPr lang="en-US"/>
           </a:p>
@@ -3059,7 +3070,7 @@
           <a:p>
             <a:fld id="{02AC24A9-CCB6-4F8D-B8DB-C2F3692CFA5A}" type="datetimeFigureOut">
               <a:rPr lang="en-US" smtClean="0"/>
-              <a:t>4/29/2020</a:t>
+              <a:t>5/6/2020</a:t>
             </a:fld>
             <a:endParaRPr lang="en-US"/>
           </a:p>
@@ -3282,7 +3293,7 @@
           <a:p>
             <a:fld id="{02AC24A9-CCB6-4F8D-B8DB-C2F3692CFA5A}" type="datetimeFigureOut">
               <a:rPr lang="en-US" smtClean="0"/>
-              <a:t>4/29/2020</a:t>
+              <a:t>5/6/2020</a:t>
             </a:fld>
             <a:endParaRPr lang="en-US"/>
           </a:p>
@@ -3462,7 +3473,7 @@
           <a:p>
             <a:fld id="{02AC24A9-CCB6-4F8D-B8DB-C2F3692CFA5A}" type="datetimeFigureOut">
               <a:rPr lang="en-US" smtClean="0"/>
-              <a:t>4/29/2020</a:t>
+              <a:t>5/6/2020</a:t>
             </a:fld>
             <a:endParaRPr lang="en-US"/>
           </a:p>
@@ -3751,7 +3762,7 @@
           <a:p>
             <a:fld id="{02AC24A9-CCB6-4F8D-B8DB-C2F3692CFA5A}" type="datetimeFigureOut">
               <a:rPr lang="en-US" smtClean="0"/>
-              <a:t>4/29/2020</a:t>
+              <a:t>5/6/2020</a:t>
             </a:fld>
             <a:endParaRPr lang="en-US"/>
           </a:p>
@@ -3993,7 +4004,7 @@
           <a:p>
             <a:fld id="{02AC24A9-CCB6-4F8D-B8DB-C2F3692CFA5A}" type="datetimeFigureOut">
               <a:rPr lang="en-US" smtClean="0"/>
-              <a:t>4/29/2020</a:t>
+              <a:t>5/6/2020</a:t>
             </a:fld>
             <a:endParaRPr lang="en-US"/>
           </a:p>
@@ -4372,7 +4383,7 @@
           <a:p>
             <a:fld id="{02AC24A9-CCB6-4F8D-B8DB-C2F3692CFA5A}" type="datetimeFigureOut">
               <a:rPr lang="en-US" smtClean="0"/>
-              <a:t>4/29/2020</a:t>
+              <a:t>5/6/2020</a:t>
             </a:fld>
             <a:endParaRPr lang="en-US"/>
           </a:p>
@@ -4490,7 +4501,7 @@
           <a:p>
             <a:fld id="{02AC24A9-CCB6-4F8D-B8DB-C2F3692CFA5A}" type="datetimeFigureOut">
               <a:rPr lang="en-US" smtClean="0"/>
-              <a:t>4/29/2020</a:t>
+              <a:t>5/6/2020</a:t>
             </a:fld>
             <a:endParaRPr lang="en-US"/>
           </a:p>
@@ -4585,7 +4596,7 @@
           <a:p>
             <a:fld id="{02AC24A9-CCB6-4F8D-B8DB-C2F3692CFA5A}" type="datetimeFigureOut">
               <a:rPr lang="en-US" smtClean="0"/>
-              <a:t>4/29/2020</a:t>
+              <a:t>5/6/2020</a:t>
             </a:fld>
             <a:endParaRPr lang="en-US"/>
           </a:p>
@@ -4834,7 +4845,7 @@
           <a:p>
             <a:fld id="{02AC24A9-CCB6-4F8D-B8DB-C2F3692CFA5A}" type="datetimeFigureOut">
               <a:rPr lang="en-US" smtClean="0"/>
-              <a:t>4/29/2020</a:t>
+              <a:t>5/6/2020</a:t>
             </a:fld>
             <a:endParaRPr lang="en-US"/>
           </a:p>
@@ -5091,7 +5102,7 @@
           <a:p>
             <a:fld id="{02AC24A9-CCB6-4F8D-B8DB-C2F3692CFA5A}" type="datetimeFigureOut">
               <a:rPr lang="en-US" smtClean="0"/>
-              <a:t>4/29/2020</a:t>
+              <a:t>5/6/2020</a:t>
             </a:fld>
             <a:endParaRPr lang="en-US"/>
           </a:p>
@@ -5334,7 +5345,7 @@
           <a:p>
             <a:fld id="{02AC24A9-CCB6-4F8D-B8DB-C2F3692CFA5A}" type="datetimeFigureOut">
               <a:rPr lang="en-US" smtClean="0"/>
-              <a:t>4/29/2020</a:t>
+              <a:t>5/6/2020</a:t>
             </a:fld>
             <a:endParaRPr lang="en-US"/>
           </a:p>
@@ -5842,6 +5853,271 @@
 </p:sld>
 </file>
 
+<file path=ppt/slides/slide10.xml><?xml version="1.0" encoding="utf-8"?>
+<p:sld xmlns:a="http://schemas.openxmlformats.org/drawingml/2006/main" xmlns:r="http://schemas.openxmlformats.org/officeDocument/2006/relationships" xmlns:p="http://schemas.openxmlformats.org/presentationml/2006/main">
+  <p:cSld>
+    <p:spTree>
+      <p:nvGrpSpPr>
+        <p:cNvPr id="1" name=""/>
+        <p:cNvGrpSpPr/>
+        <p:nvPr/>
+      </p:nvGrpSpPr>
+      <p:grpSpPr>
+        <a:xfrm>
+          <a:off x="0" y="0"/>
+          <a:ext cx="0" cy="0"/>
+          <a:chOff x="0" y="0"/>
+          <a:chExt cx="0" cy="0"/>
+        </a:xfrm>
+      </p:grpSpPr>
+      <p:sp>
+        <p:nvSpPr>
+          <p:cNvPr id="2" name="Title 1">
+            <a:extLst>
+              <a:ext uri="{FF2B5EF4-FFF2-40B4-BE49-F238E27FC236}">
+                <a16:creationId xmlns:a16="http://schemas.microsoft.com/office/drawing/2014/main" id="{24713D42-717F-4B82-A81F-0F06DC998E6D}"/>
+              </a:ext>
+            </a:extLst>
+          </p:cNvPr>
+          <p:cNvSpPr>
+            <a:spLocks noGrp="1"/>
+          </p:cNvSpPr>
+          <p:nvPr>
+            <p:ph type="title"/>
+          </p:nvPr>
+        </p:nvSpPr>
+        <p:spPr/>
+        <p:txBody>
+          <a:bodyPr/>
+          <a:lstStyle/>
+          <a:p>
+            <a:r>
+              <a:rPr lang="en-US" dirty="0"/>
+              <a:t>Tools</a:t>
+            </a:r>
+          </a:p>
+        </p:txBody>
+      </p:sp>
+      <p:sp>
+        <p:nvSpPr>
+          <p:cNvPr id="3" name="Content Placeholder 2">
+            <a:extLst>
+              <a:ext uri="{FF2B5EF4-FFF2-40B4-BE49-F238E27FC236}">
+                <a16:creationId xmlns:a16="http://schemas.microsoft.com/office/drawing/2014/main" id="{98CE7D5F-2A6B-4DC2-8E81-3509C5A57692}"/>
+              </a:ext>
+            </a:extLst>
+          </p:cNvPr>
+          <p:cNvSpPr>
+            <a:spLocks noGrp="1"/>
+          </p:cNvSpPr>
+          <p:nvPr>
+            <p:ph idx="1"/>
+          </p:nvPr>
+        </p:nvSpPr>
+        <p:spPr/>
+        <p:txBody>
+          <a:bodyPr/>
+          <a:lstStyle/>
+          <a:p>
+            <a:pPr>
+              <a:lnSpc>
+                <a:spcPct val="200000"/>
+              </a:lnSpc>
+            </a:pPr>
+            <a:r>
+              <a:rPr lang="en-US" dirty="0"/>
+              <a:t>Record keeping and version control</a:t>
+            </a:r>
+          </a:p>
+          <a:p>
+            <a:pPr lvl="1">
+              <a:lnSpc>
+                <a:spcPct val="200000"/>
+              </a:lnSpc>
+            </a:pPr>
+            <a:r>
+              <a:rPr lang="en-US" dirty="0"/>
+              <a:t>Microsoft Word</a:t>
+            </a:r>
+          </a:p>
+          <a:p>
+            <a:pPr lvl="1">
+              <a:lnSpc>
+                <a:spcPct val="200000"/>
+              </a:lnSpc>
+            </a:pPr>
+            <a:r>
+              <a:rPr lang="en-US" dirty="0"/>
+              <a:t>Microsoft Excel</a:t>
+            </a:r>
+          </a:p>
+          <a:p>
+            <a:pPr lvl="1">
+              <a:lnSpc>
+                <a:spcPct val="200000"/>
+              </a:lnSpc>
+            </a:pPr>
+            <a:r>
+              <a:rPr lang="en-US" dirty="0"/>
+              <a:t>GitHub</a:t>
+            </a:r>
+          </a:p>
+        </p:txBody>
+      </p:sp>
+    </p:spTree>
+    <p:extLst>
+      <p:ext uri="{BB962C8B-B14F-4D97-AF65-F5344CB8AC3E}">
+        <p14:creationId xmlns:p14="http://schemas.microsoft.com/office/powerpoint/2010/main" val="4163608152"/>
+      </p:ext>
+    </p:extLst>
+  </p:cSld>
+  <p:clrMapOvr>
+    <a:masterClrMapping/>
+  </p:clrMapOvr>
+</p:sld>
+</file>
+
+<file path=ppt/slides/slide11.xml><?xml version="1.0" encoding="utf-8"?>
+<p:sld xmlns:a="http://schemas.openxmlformats.org/drawingml/2006/main" xmlns:r="http://schemas.openxmlformats.org/officeDocument/2006/relationships" xmlns:p="http://schemas.openxmlformats.org/presentationml/2006/main">
+  <p:cSld>
+    <p:spTree>
+      <p:nvGrpSpPr>
+        <p:cNvPr id="1" name=""/>
+        <p:cNvGrpSpPr/>
+        <p:nvPr/>
+      </p:nvGrpSpPr>
+      <p:grpSpPr>
+        <a:xfrm>
+          <a:off x="0" y="0"/>
+          <a:ext cx="0" cy="0"/>
+          <a:chOff x="0" y="0"/>
+          <a:chExt cx="0" cy="0"/>
+        </a:xfrm>
+      </p:grpSpPr>
+      <p:sp>
+        <p:nvSpPr>
+          <p:cNvPr id="2" name="Title 1">
+            <a:extLst>
+              <a:ext uri="{FF2B5EF4-FFF2-40B4-BE49-F238E27FC236}">
+                <a16:creationId xmlns:a16="http://schemas.microsoft.com/office/drawing/2014/main" id="{C181BA01-C3FC-4DD3-97AF-8B38209D2909}"/>
+              </a:ext>
+            </a:extLst>
+          </p:cNvPr>
+          <p:cNvSpPr>
+            <a:spLocks noGrp="1"/>
+          </p:cNvSpPr>
+          <p:nvPr>
+            <p:ph type="title"/>
+          </p:nvPr>
+        </p:nvSpPr>
+        <p:spPr/>
+        <p:txBody>
+          <a:bodyPr/>
+          <a:lstStyle/>
+          <a:p>
+            <a:r>
+              <a:rPr lang="en-US" dirty="0"/>
+              <a:t>Lessons Learned</a:t>
+            </a:r>
+          </a:p>
+        </p:txBody>
+      </p:sp>
+      <p:sp>
+        <p:nvSpPr>
+          <p:cNvPr id="3" name="Content Placeholder 2">
+            <a:extLst>
+              <a:ext uri="{FF2B5EF4-FFF2-40B4-BE49-F238E27FC236}">
+                <a16:creationId xmlns:a16="http://schemas.microsoft.com/office/drawing/2014/main" id="{C08E5AF9-0376-4CC9-8B4B-8562FA4D8A6E}"/>
+              </a:ext>
+            </a:extLst>
+          </p:cNvPr>
+          <p:cNvSpPr>
+            <a:spLocks noGrp="1"/>
+          </p:cNvSpPr>
+          <p:nvPr>
+            <p:ph idx="1"/>
+          </p:nvPr>
+        </p:nvSpPr>
+        <p:spPr/>
+        <p:txBody>
+          <a:bodyPr/>
+          <a:lstStyle/>
+          <a:p>
+            <a:endParaRPr lang="en-US"/>
+          </a:p>
+        </p:txBody>
+      </p:sp>
+    </p:spTree>
+    <p:extLst>
+      <p:ext uri="{BB962C8B-B14F-4D97-AF65-F5344CB8AC3E}">
+        <p14:creationId xmlns:p14="http://schemas.microsoft.com/office/powerpoint/2010/main" val="3225989117"/>
+      </p:ext>
+    </p:extLst>
+  </p:cSld>
+  <p:clrMapOvr>
+    <a:masterClrMapping/>
+  </p:clrMapOvr>
+</p:sld>
+</file>
+
+<file path=ppt/slides/slide12.xml><?xml version="1.0" encoding="utf-8"?>
+<p:sld xmlns:a="http://schemas.openxmlformats.org/drawingml/2006/main" xmlns:r="http://schemas.openxmlformats.org/officeDocument/2006/relationships" xmlns:p="http://schemas.openxmlformats.org/presentationml/2006/main">
+  <p:cSld>
+    <p:spTree>
+      <p:nvGrpSpPr>
+        <p:cNvPr id="1" name=""/>
+        <p:cNvGrpSpPr/>
+        <p:nvPr/>
+      </p:nvGrpSpPr>
+      <p:grpSpPr>
+        <a:xfrm>
+          <a:off x="0" y="0"/>
+          <a:ext cx="0" cy="0"/>
+          <a:chOff x="0" y="0"/>
+          <a:chExt cx="0" cy="0"/>
+        </a:xfrm>
+      </p:grpSpPr>
+      <p:sp>
+        <p:nvSpPr>
+          <p:cNvPr id="4" name="Title 3">
+            <a:extLst>
+              <a:ext uri="{FF2B5EF4-FFF2-40B4-BE49-F238E27FC236}">
+                <a16:creationId xmlns:a16="http://schemas.microsoft.com/office/drawing/2014/main" id="{278C038B-D998-4F60-BBCC-79D57DEB4E24}"/>
+              </a:ext>
+            </a:extLst>
+          </p:cNvPr>
+          <p:cNvSpPr>
+            <a:spLocks noGrp="1"/>
+          </p:cNvSpPr>
+          <p:nvPr>
+            <p:ph type="title"/>
+          </p:nvPr>
+        </p:nvSpPr>
+        <p:spPr/>
+        <p:txBody>
+          <a:bodyPr/>
+          <a:lstStyle/>
+          <a:p>
+            <a:r>
+              <a:rPr lang="en-US" dirty="0"/>
+              <a:t>Money Hub Demo</a:t>
+            </a:r>
+          </a:p>
+        </p:txBody>
+      </p:sp>
+    </p:spTree>
+    <p:extLst>
+      <p:ext uri="{BB962C8B-B14F-4D97-AF65-F5344CB8AC3E}">
+        <p14:creationId xmlns:p14="http://schemas.microsoft.com/office/powerpoint/2010/main" val="1448078619"/>
+      </p:ext>
+    </p:extLst>
+  </p:cSld>
+  <p:clrMapOvr>
+    <a:masterClrMapping/>
+  </p:clrMapOvr>
+</p:sld>
+</file>
+
 <file path=ppt/slides/slide2.xml><?xml version="1.0" encoding="utf-8"?>
 <p:sld xmlns:a="http://schemas.openxmlformats.org/drawingml/2006/main" xmlns:r="http://schemas.openxmlformats.org/officeDocument/2006/relationships" xmlns:p="http://schemas.openxmlformats.org/presentationml/2006/main">
   <p:cSld>
@@ -5947,7 +6223,7 @@
           <p:cNvPr id="2" name="Title 1">
             <a:extLst>
               <a:ext uri="{FF2B5EF4-FFF2-40B4-BE49-F238E27FC236}">
-                <a16:creationId xmlns:a16="http://schemas.microsoft.com/office/drawing/2014/main" id="{22FD240D-ABE9-4988-B9B4-9863F22129A3}"/>
+                <a16:creationId xmlns:a16="http://schemas.microsoft.com/office/drawing/2014/main" id="{533C8731-33F4-4891-8934-6510233EB82C}"/>
               </a:ext>
             </a:extLst>
           </p:cNvPr>
@@ -5975,7 +6251,7 @@
           <p:cNvPr id="3" name="Content Placeholder 2">
             <a:extLst>
               <a:ext uri="{FF2B5EF4-FFF2-40B4-BE49-F238E27FC236}">
-                <a16:creationId xmlns:a16="http://schemas.microsoft.com/office/drawing/2014/main" id="{1A9F0DAE-C53A-40DD-8E71-9D13A2686C5B}"/>
+                <a16:creationId xmlns:a16="http://schemas.microsoft.com/office/drawing/2014/main" id="{28EA2183-00B2-4F3A-9A56-BE25EED9C9DF}"/>
               </a:ext>
             </a:extLst>
           </p:cNvPr>
@@ -5988,17 +6264,104 @@
         </p:nvSpPr>
         <p:spPr/>
         <p:txBody>
-          <a:bodyPr/>
-          <a:lstStyle/>
-          <a:p>
-            <a:endParaRPr lang="en-US"/>
+          <a:bodyPr>
+            <a:normAutofit fontScale="92500" lnSpcReduction="10000"/>
+          </a:bodyPr>
+          <a:lstStyle/>
+          <a:p>
+            <a:pPr>
+              <a:lnSpc>
+                <a:spcPct val="150000"/>
+              </a:lnSpc>
+            </a:pPr>
+            <a:r>
+              <a:rPr lang="en-US" dirty="0"/>
+              <a:t>Considerations</a:t>
+            </a:r>
+          </a:p>
+          <a:p>
+            <a:pPr lvl="1">
+              <a:lnSpc>
+                <a:spcPct val="150000"/>
+              </a:lnSpc>
+            </a:pPr>
+            <a:r>
+              <a:rPr lang="en-US" dirty="0"/>
+              <a:t>Testing and reliability</a:t>
+            </a:r>
+          </a:p>
+          <a:p>
+            <a:pPr lvl="1">
+              <a:lnSpc>
+                <a:spcPct val="150000"/>
+              </a:lnSpc>
+            </a:pPr>
+            <a:r>
+              <a:rPr lang="en-US" dirty="0"/>
+              <a:t>Network connectivity and usage</a:t>
+            </a:r>
+          </a:p>
+          <a:p>
+            <a:pPr lvl="1">
+              <a:lnSpc>
+                <a:spcPct val="150000"/>
+              </a:lnSpc>
+            </a:pPr>
+            <a:r>
+              <a:rPr lang="en-US" dirty="0"/>
+              <a:t>Server persistence</a:t>
+            </a:r>
+          </a:p>
+          <a:p>
+            <a:pPr>
+              <a:lnSpc>
+                <a:spcPct val="150000"/>
+              </a:lnSpc>
+            </a:pPr>
+            <a:r>
+              <a:rPr lang="en-US" dirty="0"/>
+              <a:t>Development</a:t>
+            </a:r>
+          </a:p>
+          <a:p>
+            <a:pPr lvl="1">
+              <a:lnSpc>
+                <a:spcPct val="150000"/>
+              </a:lnSpc>
+            </a:pPr>
+            <a:r>
+              <a:rPr lang="en-US" dirty="0"/>
+              <a:t>Waterfall design method</a:t>
+            </a:r>
+          </a:p>
+          <a:p>
+            <a:pPr lvl="1">
+              <a:lnSpc>
+                <a:spcPct val="150000"/>
+              </a:lnSpc>
+            </a:pPr>
+            <a:r>
+              <a:rPr lang="en-US" dirty="0"/>
+              <a:t>Proof-of-concept prototyping</a:t>
+            </a:r>
+          </a:p>
+          <a:p>
+            <a:pPr lvl="1">
+              <a:lnSpc>
+                <a:spcPct val="150000"/>
+              </a:lnSpc>
+            </a:pPr>
+            <a:r>
+              <a:rPr lang="en-US" dirty="0"/>
+              <a:t>Component Reuse</a:t>
+            </a:r>
           </a:p>
         </p:txBody>
       </p:sp>
     </p:spTree>
     <p:extLst>
       <p:ext uri="{BB962C8B-B14F-4D97-AF65-F5344CB8AC3E}">
-        <p14:creationId xmlns:p14="http://schemas.microsoft.com/office/powerpoint/2010/main" val="2043260370"/>
+        <p14:creationId xmlns:p14="http://schemas.microsoft.com/office/powerpoint/2010/main" val="3754170527"/>
       </p:ext>
     </p:extLst>
   </p:cSld>
@@ -6030,7 +6393,7 @@
           <p:cNvPr id="2" name="Title 1">
             <a:extLst>
               <a:ext uri="{FF2B5EF4-FFF2-40B4-BE49-F238E27FC236}">
-                <a16:creationId xmlns:a16="http://schemas.microsoft.com/office/drawing/2014/main" id="{8CCA3909-1494-4240-B873-E5F3E7B96206}"/>
+                <a16:creationId xmlns:a16="http://schemas.microsoft.com/office/drawing/2014/main" id="{23A1B2CE-1314-40B3-98FE-791C13211E0A}"/>
               </a:ext>
             </a:extLst>
           </p:cNvPr>
@@ -6048,7 +6411,7 @@
           <a:p>
             <a:r>
               <a:rPr lang="en-US" dirty="0"/>
-              <a:t>Tools</a:t>
+              <a:t>Design</a:t>
             </a:r>
           </a:p>
         </p:txBody>
@@ -6058,7 +6421,7 @@
           <p:cNvPr id="3" name="Content Placeholder 2">
             <a:extLst>
               <a:ext uri="{FF2B5EF4-FFF2-40B4-BE49-F238E27FC236}">
-                <a16:creationId xmlns:a16="http://schemas.microsoft.com/office/drawing/2014/main" id="{542EB698-D03D-4142-99F1-5CCBBFEE3F69}"/>
+                <a16:creationId xmlns:a16="http://schemas.microsoft.com/office/drawing/2014/main" id="{5B38B893-6122-4337-B536-0D3DF185DEDC}"/>
               </a:ext>
             </a:extLst>
           </p:cNvPr>
@@ -6074,14 +6437,55 @@
           <a:bodyPr/>
           <a:lstStyle/>
           <a:p>
-            <a:endParaRPr lang="en-US"/>
+            <a:pPr>
+              <a:lnSpc>
+                <a:spcPct val="200000"/>
+              </a:lnSpc>
+            </a:pPr>
+            <a:r>
+              <a:rPr lang="en-US" dirty="0"/>
+              <a:t>System Architecture</a:t>
+            </a:r>
+          </a:p>
+          <a:p>
+            <a:pPr lvl="1">
+              <a:lnSpc>
+                <a:spcPct val="200000"/>
+              </a:lnSpc>
+            </a:pPr>
+            <a:r>
+              <a:rPr lang="en-US" dirty="0"/>
+              <a:t>Query based</a:t>
+            </a:r>
+          </a:p>
+          <a:p>
+            <a:pPr lvl="1">
+              <a:lnSpc>
+                <a:spcPct val="200000"/>
+              </a:lnSpc>
+            </a:pPr>
+            <a:r>
+              <a:rPr lang="en-US" dirty="0"/>
+              <a:t>Client-Server relationship</a:t>
+            </a:r>
+          </a:p>
+          <a:p>
+            <a:pPr lvl="2">
+              <a:lnSpc>
+                <a:spcPct val="200000"/>
+              </a:lnSpc>
+            </a:pPr>
+            <a:r>
+              <a:rPr lang="en-US" dirty="0"/>
+              <a:t>Subsidiary client-server relationship between server and database</a:t>
+            </a:r>
           </a:p>
         </p:txBody>
       </p:sp>
     </p:spTree>
     <p:extLst>
       <p:ext uri="{BB962C8B-B14F-4D97-AF65-F5344CB8AC3E}">
-        <p14:creationId xmlns:p14="http://schemas.microsoft.com/office/powerpoint/2010/main" val="3890603577"/>
+        <p14:creationId xmlns:p14="http://schemas.microsoft.com/office/powerpoint/2010/main" val="2728667956"/>
       </p:ext>
     </p:extLst>
   </p:cSld>
@@ -6113,7 +6517,7 @@
           <p:cNvPr id="2" name="Title 1">
             <a:extLst>
               <a:ext uri="{FF2B5EF4-FFF2-40B4-BE49-F238E27FC236}">
-                <a16:creationId xmlns:a16="http://schemas.microsoft.com/office/drawing/2014/main" id="{C181BA01-C3FC-4DD3-97AF-8B38209D2909}"/>
+                <a16:creationId xmlns:a16="http://schemas.microsoft.com/office/drawing/2014/main" id="{22FD240D-ABE9-4988-B9B4-9863F22129A3}"/>
               </a:ext>
             </a:extLst>
           </p:cNvPr>
@@ -6131,40 +6535,148 @@
           <a:p>
             <a:r>
               <a:rPr lang="en-US" dirty="0"/>
-              <a:t>Lessons Learned</a:t>
-            </a:r>
-          </a:p>
-        </p:txBody>
-      </p:sp>
-      <p:sp>
-        <p:nvSpPr>
-          <p:cNvPr id="3" name="Content Placeholder 2">
+              <a:t>Design</a:t>
+            </a:r>
+          </a:p>
+        </p:txBody>
+      </p:sp>
+      <p:pic>
+        <p:nvPicPr>
+          <p:cNvPr id="5" name="Content Placeholder 4" descr="A screenshot of a computer&#10;&#10;Description automatically generated">
             <a:extLst>
               <a:ext uri="{FF2B5EF4-FFF2-40B4-BE49-F238E27FC236}">
-                <a16:creationId xmlns:a16="http://schemas.microsoft.com/office/drawing/2014/main" id="{C08E5AF9-0376-4CC9-8B4B-8562FA4D8A6E}"/>
+                <a16:creationId xmlns:a16="http://schemas.microsoft.com/office/drawing/2014/main" id="{31336F02-1466-46AC-9D1D-B88CF9C2A5DE}"/>
               </a:ext>
             </a:extLst>
           </p:cNvPr>
-          <p:cNvSpPr>
-            <a:spLocks noGrp="1"/>
-          </p:cNvSpPr>
+          <p:cNvPicPr>
+            <a:picLocks noGrp="1" noChangeAspect="1"/>
+          </p:cNvPicPr>
           <p:nvPr>
             <p:ph idx="1"/>
           </p:nvPr>
-        </p:nvSpPr>
-        <p:spPr/>
-        <p:txBody>
-          <a:bodyPr/>
-          <a:lstStyle/>
-          <a:p>
-            <a:endParaRPr lang="en-US"/>
-          </a:p>
-        </p:txBody>
-      </p:sp>
+        </p:nvPicPr>
+        <p:blipFill>
+          <a:blip r:embed="rId2">
+            <a:extLst>
+              <a:ext uri="{28A0092B-C50C-407E-A947-70E740481C1C}">
+                <a14:useLocalDpi xmlns:a14="http://schemas.microsoft.com/office/drawing/2010/main" val="0"/>
+              </a:ext>
+            </a:extLst>
+          </a:blip>
+          <a:stretch>
+            <a:fillRect/>
+          </a:stretch>
+        </p:blipFill>
+        <p:spPr>
+          <a:xfrm>
+            <a:off x="482227" y="2069314"/>
+            <a:ext cx="4024313" cy="4024313"/>
+          </a:xfrm>
+        </p:spPr>
+      </p:pic>
+      <p:pic>
+        <p:nvPicPr>
+          <p:cNvPr id="7" name="Picture 6" descr="A screenshot of a cell phone&#10;&#10;Description automatically generated">
+            <a:extLst>
+              <a:ext uri="{FF2B5EF4-FFF2-40B4-BE49-F238E27FC236}">
+                <a16:creationId xmlns:a16="http://schemas.microsoft.com/office/drawing/2014/main" id="{7428FD2E-D1BE-43AB-9F24-8561A4C1AB17}"/>
+              </a:ext>
+            </a:extLst>
+          </p:cNvPr>
+          <p:cNvPicPr>
+            <a:picLocks noChangeAspect="1"/>
+          </p:cNvPicPr>
+          <p:nvPr/>
+        </p:nvPicPr>
+        <p:blipFill>
+          <a:blip r:embed="rId3">
+            <a:extLst>
+              <a:ext uri="{28A0092B-C50C-407E-A947-70E740481C1C}">
+                <a14:useLocalDpi xmlns:a14="http://schemas.microsoft.com/office/drawing/2010/main" val="0"/>
+              </a:ext>
+            </a:extLst>
+          </a:blip>
+          <a:stretch>
+            <a:fillRect/>
+          </a:stretch>
+        </p:blipFill>
+        <p:spPr>
+          <a:xfrm>
+            <a:off x="4675858" y="2164700"/>
+            <a:ext cx="3461213" cy="3928927"/>
+          </a:xfrm>
+          <a:prstGeom prst="roundRect">
+            <a:avLst>
+              <a:gd name="adj" fmla="val 8594"/>
+            </a:avLst>
+          </a:prstGeom>
+          <a:solidFill>
+            <a:srgbClr val="FFFFFF">
+              <a:shade val="85000"/>
+            </a:srgbClr>
+          </a:solidFill>
+          <a:ln>
+            <a:noFill/>
+          </a:ln>
+          <a:effectLst>
+            <a:reflection blurRad="12700" stA="38000" endPos="28000" dist="5000" dir="5400000" sy="-100000" algn="bl" rotWithShape="0"/>
+          </a:effectLst>
+        </p:spPr>
+      </p:pic>
+      <p:pic>
+        <p:nvPicPr>
+          <p:cNvPr id="9" name="Picture 8" descr="A picture containing ware, spring, leaf&#10;&#10;Description automatically generated">
+            <a:extLst>
+              <a:ext uri="{FF2B5EF4-FFF2-40B4-BE49-F238E27FC236}">
+                <a16:creationId xmlns:a16="http://schemas.microsoft.com/office/drawing/2014/main" id="{135192EF-C18D-4FBA-8581-DFE2DFA43CE4}"/>
+              </a:ext>
+            </a:extLst>
+          </p:cNvPr>
+          <p:cNvPicPr>
+            <a:picLocks noChangeAspect="1"/>
+          </p:cNvPicPr>
+          <p:nvPr/>
+        </p:nvPicPr>
+        <p:blipFill>
+          <a:blip r:embed="rId4">
+            <a:extLst>
+              <a:ext uri="{28A0092B-C50C-407E-A947-70E740481C1C}">
+                <a14:useLocalDpi xmlns:a14="http://schemas.microsoft.com/office/drawing/2010/main" val="0"/>
+              </a:ext>
+            </a:extLst>
+          </a:blip>
+          <a:stretch>
+            <a:fillRect/>
+          </a:stretch>
+        </p:blipFill>
+        <p:spPr>
+          <a:xfrm>
+            <a:off x="8306389" y="2965014"/>
+            <a:ext cx="3461214" cy="3128613"/>
+          </a:xfrm>
+          <a:prstGeom prst="roundRect">
+            <a:avLst>
+              <a:gd name="adj" fmla="val 8594"/>
+            </a:avLst>
+          </a:prstGeom>
+          <a:solidFill>
+            <a:srgbClr val="FFFFFF">
+              <a:shade val="85000"/>
+            </a:srgbClr>
+          </a:solidFill>
+          <a:ln>
+            <a:noFill/>
+          </a:ln>
+          <a:effectLst>
+            <a:reflection blurRad="12700" stA="38000" endPos="28000" dist="5000" dir="5400000" sy="-100000" algn="bl" rotWithShape="0"/>
+          </a:effectLst>
+        </p:spPr>
+      </p:pic>
     </p:spTree>
     <p:extLst>
       <p:ext uri="{BB962C8B-B14F-4D97-AF65-F5344CB8AC3E}">
-        <p14:creationId xmlns:p14="http://schemas.microsoft.com/office/powerpoint/2010/main" val="3225989117"/>
+        <p14:creationId xmlns:p14="http://schemas.microsoft.com/office/powerpoint/2010/main" val="2043260370"/>
       </p:ext>
     </p:extLst>
   </p:cSld>
@@ -6193,10 +6705,10 @@
       </p:grpSpPr>
       <p:sp>
         <p:nvSpPr>
-          <p:cNvPr id="4" name="Title 3">
+          <p:cNvPr id="2" name="Title 1">
             <a:extLst>
               <a:ext uri="{FF2B5EF4-FFF2-40B4-BE49-F238E27FC236}">
-                <a16:creationId xmlns:a16="http://schemas.microsoft.com/office/drawing/2014/main" id="{278C038B-D998-4F60-BBCC-79D57DEB4E24}"/>
+                <a16:creationId xmlns:a16="http://schemas.microsoft.com/office/drawing/2014/main" id="{4D3A39A0-1986-46FB-A8AD-A1C6055130C5}"/>
               </a:ext>
             </a:extLst>
           </p:cNvPr>
@@ -6214,15 +6726,544 @@
           <a:p>
             <a:r>
               <a:rPr lang="en-US" dirty="0"/>
-              <a:t>Money Hub Demo</a:t>
-            </a:r>
-          </a:p>
-        </p:txBody>
-      </p:sp>
+              <a:t>Design</a:t>
+            </a:r>
+          </a:p>
+        </p:txBody>
+      </p:sp>
+      <p:pic>
+        <p:nvPicPr>
+          <p:cNvPr id="4" name="Content Placeholder 3">
+            <a:extLst>
+              <a:ext uri="{FF2B5EF4-FFF2-40B4-BE49-F238E27FC236}">
+                <a16:creationId xmlns:a16="http://schemas.microsoft.com/office/drawing/2014/main" id="{DC117E63-32E2-40BE-951C-EE81525C8A00}"/>
+              </a:ext>
+            </a:extLst>
+          </p:cNvPr>
+          <p:cNvPicPr>
+            <a:picLocks noGrp="1"/>
+          </p:cNvPicPr>
+          <p:nvPr>
+            <p:ph idx="1"/>
+          </p:nvPr>
+        </p:nvPicPr>
+        <p:blipFill>
+          <a:blip r:embed="rId2"/>
+          <a:stretch>
+            <a:fillRect/>
+          </a:stretch>
+        </p:blipFill>
+        <p:spPr>
+          <a:xfrm>
+            <a:off x="288953" y="1768384"/>
+            <a:ext cx="5141463" cy="2365077"/>
+          </a:xfrm>
+          <a:prstGeom prst="rect">
+            <a:avLst/>
+          </a:prstGeom>
+        </p:spPr>
+      </p:pic>
+      <p:pic>
+        <p:nvPicPr>
+          <p:cNvPr id="5" name="Picture 4">
+            <a:extLst>
+              <a:ext uri="{FF2B5EF4-FFF2-40B4-BE49-F238E27FC236}">
+                <a16:creationId xmlns:a16="http://schemas.microsoft.com/office/drawing/2014/main" id="{81D504BA-E4B6-4E88-8961-F8431E4676E7}"/>
+              </a:ext>
+            </a:extLst>
+          </p:cNvPr>
+          <p:cNvPicPr/>
+          <p:nvPr/>
+        </p:nvPicPr>
+        <p:blipFill>
+          <a:blip r:embed="rId3">
+            <a:extLst>
+              <a:ext uri="{28A0092B-C50C-407E-A947-70E740481C1C}">
+                <a14:useLocalDpi xmlns:a14="http://schemas.microsoft.com/office/drawing/2010/main" val="0"/>
+              </a:ext>
+            </a:extLst>
+          </a:blip>
+          <a:stretch>
+            <a:fillRect/>
+          </a:stretch>
+        </p:blipFill>
+        <p:spPr>
+          <a:xfrm>
+            <a:off x="5972129" y="3429000"/>
+            <a:ext cx="5342255" cy="2623820"/>
+          </a:xfrm>
+          <a:prstGeom prst="rect">
+            <a:avLst/>
+          </a:prstGeom>
+        </p:spPr>
+      </p:pic>
     </p:spTree>
     <p:extLst>
       <p:ext uri="{BB962C8B-B14F-4D97-AF65-F5344CB8AC3E}">
-        <p14:creationId xmlns:p14="http://schemas.microsoft.com/office/powerpoint/2010/main" val="1448078619"/>
+        <p14:creationId xmlns:p14="http://schemas.microsoft.com/office/powerpoint/2010/main" val="1882058442"/>
+      </p:ext>
+    </p:extLst>
+  </p:cSld>
+  <p:clrMapOvr>
+    <a:masterClrMapping/>
+  </p:clrMapOvr>
+</p:sld>
+</file>
+
+<file path=ppt/slides/slide7.xml><?xml version="1.0" encoding="utf-8"?>
+<p:sld xmlns:a="http://schemas.openxmlformats.org/drawingml/2006/main" xmlns:r="http://schemas.openxmlformats.org/officeDocument/2006/relationships" xmlns:p="http://schemas.openxmlformats.org/presentationml/2006/main">
+  <p:cSld>
+    <p:spTree>
+      <p:nvGrpSpPr>
+        <p:cNvPr id="1" name=""/>
+        <p:cNvGrpSpPr/>
+        <p:nvPr/>
+      </p:nvGrpSpPr>
+      <p:grpSpPr>
+        <a:xfrm>
+          <a:off x="0" y="0"/>
+          <a:ext cx="0" cy="0"/>
+          <a:chOff x="0" y="0"/>
+          <a:chExt cx="0" cy="0"/>
+        </a:xfrm>
+      </p:grpSpPr>
+      <p:sp>
+        <p:nvSpPr>
+          <p:cNvPr id="2" name="Title 1">
+            <a:extLst>
+              <a:ext uri="{FF2B5EF4-FFF2-40B4-BE49-F238E27FC236}">
+                <a16:creationId xmlns:a16="http://schemas.microsoft.com/office/drawing/2014/main" id="{8CCA3909-1494-4240-B873-E5F3E7B96206}"/>
+              </a:ext>
+            </a:extLst>
+          </p:cNvPr>
+          <p:cNvSpPr>
+            <a:spLocks noGrp="1"/>
+          </p:cNvSpPr>
+          <p:nvPr>
+            <p:ph type="title"/>
+          </p:nvPr>
+        </p:nvSpPr>
+        <p:spPr/>
+        <p:txBody>
+          <a:bodyPr/>
+          <a:lstStyle/>
+          <a:p>
+            <a:r>
+              <a:rPr lang="en-US" dirty="0"/>
+              <a:t>Tools</a:t>
+            </a:r>
+          </a:p>
+        </p:txBody>
+      </p:sp>
+      <p:sp>
+        <p:nvSpPr>
+          <p:cNvPr id="3" name="Content Placeholder 2">
+            <a:extLst>
+              <a:ext uri="{FF2B5EF4-FFF2-40B4-BE49-F238E27FC236}">
+                <a16:creationId xmlns:a16="http://schemas.microsoft.com/office/drawing/2014/main" id="{542EB698-D03D-4142-99F1-5CCBBFEE3F69}"/>
+              </a:ext>
+            </a:extLst>
+          </p:cNvPr>
+          <p:cNvSpPr>
+            <a:spLocks noGrp="1"/>
+          </p:cNvSpPr>
+          <p:nvPr>
+            <p:ph idx="1"/>
+          </p:nvPr>
+        </p:nvSpPr>
+        <p:spPr/>
+        <p:txBody>
+          <a:bodyPr>
+            <a:normAutofit lnSpcReduction="10000"/>
+          </a:bodyPr>
+          <a:lstStyle/>
+          <a:p>
+            <a:pPr>
+              <a:lnSpc>
+                <a:spcPct val="150000"/>
+              </a:lnSpc>
+            </a:pPr>
+            <a:r>
+              <a:rPr lang="en-US" dirty="0"/>
+              <a:t>Development tools</a:t>
+            </a:r>
+          </a:p>
+          <a:p>
+            <a:pPr lvl="1">
+              <a:lnSpc>
+                <a:spcPct val="150000"/>
+              </a:lnSpc>
+            </a:pPr>
+            <a:r>
+              <a:rPr lang="en-US" dirty="0"/>
+              <a:t>Visual Studio 2019</a:t>
+            </a:r>
+          </a:p>
+          <a:p>
+            <a:pPr lvl="1">
+              <a:lnSpc>
+                <a:spcPct val="150000"/>
+              </a:lnSpc>
+            </a:pPr>
+            <a:r>
+              <a:rPr lang="en-US" dirty="0"/>
+              <a:t>Visual Studio Code</a:t>
+            </a:r>
+          </a:p>
+          <a:p>
+            <a:pPr lvl="1">
+              <a:lnSpc>
+                <a:spcPct val="150000"/>
+              </a:lnSpc>
+            </a:pPr>
+            <a:r>
+              <a:rPr lang="en-US" dirty="0"/>
+              <a:t>Windows PowerShell</a:t>
+            </a:r>
+          </a:p>
+          <a:p>
+            <a:pPr lvl="1">
+              <a:lnSpc>
+                <a:spcPct val="150000"/>
+              </a:lnSpc>
+            </a:pPr>
+            <a:r>
+              <a:rPr lang="en-US" dirty="0"/>
+              <a:t>Windows Subsystem for Linux – Ubuntu Terminal</a:t>
+            </a:r>
+          </a:p>
+          <a:p>
+            <a:pPr lvl="1">
+              <a:lnSpc>
+                <a:spcPct val="150000"/>
+              </a:lnSpc>
+            </a:pPr>
+            <a:r>
+              <a:rPr lang="en-US" dirty="0"/>
+              <a:t>MySQL Server 8.0</a:t>
+            </a:r>
+          </a:p>
+          <a:p>
+            <a:pPr lvl="1">
+              <a:lnSpc>
+                <a:spcPct val="150000"/>
+              </a:lnSpc>
+            </a:pPr>
+            <a:r>
+              <a:rPr lang="en-US" dirty="0"/>
+              <a:t>Paint.NET</a:t>
+            </a:r>
+          </a:p>
+          <a:p>
+            <a:pPr lvl="1">
+              <a:lnSpc>
+                <a:spcPct val="150000"/>
+              </a:lnSpc>
+            </a:pPr>
+            <a:r>
+              <a:rPr lang="en-US" dirty="0" err="1"/>
+              <a:t>StarUML</a:t>
+            </a:r>
+            <a:endParaRPr lang="en-US" dirty="0"/>
+          </a:p>
+        </p:txBody>
+      </p:sp>
+    </p:spTree>
+    <p:extLst>
+      <p:ext uri="{BB962C8B-B14F-4D97-AF65-F5344CB8AC3E}">
+        <p14:creationId xmlns:p14="http://schemas.microsoft.com/office/powerpoint/2010/main" val="3890603577"/>
+      </p:ext>
+    </p:extLst>
+  </p:cSld>
+  <p:clrMapOvr>
+    <a:masterClrMapping/>
+  </p:clrMapOvr>
+</p:sld>
+</file>
+
+<file path=ppt/slides/slide8.xml><?xml version="1.0" encoding="utf-8"?>
+<p:sld xmlns:a="http://schemas.openxmlformats.org/drawingml/2006/main" xmlns:r="http://schemas.openxmlformats.org/officeDocument/2006/relationships" xmlns:p="http://schemas.openxmlformats.org/presentationml/2006/main">
+  <p:cSld>
+    <p:spTree>
+      <p:nvGrpSpPr>
+        <p:cNvPr id="1" name=""/>
+        <p:cNvGrpSpPr/>
+        <p:nvPr/>
+      </p:nvGrpSpPr>
+      <p:grpSpPr>
+        <a:xfrm>
+          <a:off x="0" y="0"/>
+          <a:ext cx="0" cy="0"/>
+          <a:chOff x="0" y="0"/>
+          <a:chExt cx="0" cy="0"/>
+        </a:xfrm>
+      </p:grpSpPr>
+      <p:sp>
+        <p:nvSpPr>
+          <p:cNvPr id="2" name="Title 1">
+            <a:extLst>
+              <a:ext uri="{FF2B5EF4-FFF2-40B4-BE49-F238E27FC236}">
+                <a16:creationId xmlns:a16="http://schemas.microsoft.com/office/drawing/2014/main" id="{45951B0B-693F-4654-A4A2-34672E682E66}"/>
+              </a:ext>
+            </a:extLst>
+          </p:cNvPr>
+          <p:cNvSpPr>
+            <a:spLocks noGrp="1"/>
+          </p:cNvSpPr>
+          <p:nvPr>
+            <p:ph type="title"/>
+          </p:nvPr>
+        </p:nvSpPr>
+        <p:spPr/>
+        <p:txBody>
+          <a:bodyPr/>
+          <a:lstStyle/>
+          <a:p>
+            <a:r>
+              <a:rPr lang="en-US" dirty="0"/>
+              <a:t>Tools</a:t>
+            </a:r>
+          </a:p>
+        </p:txBody>
+      </p:sp>
+      <p:sp>
+        <p:nvSpPr>
+          <p:cNvPr id="3" name="Content Placeholder 2">
+            <a:extLst>
+              <a:ext uri="{FF2B5EF4-FFF2-40B4-BE49-F238E27FC236}">
+                <a16:creationId xmlns:a16="http://schemas.microsoft.com/office/drawing/2014/main" id="{CF5EF554-E7B6-4CE4-BF1C-442F1F7E3132}"/>
+              </a:ext>
+            </a:extLst>
+          </p:cNvPr>
+          <p:cNvSpPr>
+            <a:spLocks noGrp="1"/>
+          </p:cNvSpPr>
+          <p:nvPr>
+            <p:ph idx="1"/>
+          </p:nvPr>
+        </p:nvSpPr>
+        <p:spPr/>
+        <p:txBody>
+          <a:bodyPr/>
+          <a:lstStyle/>
+          <a:p>
+            <a:pPr>
+              <a:lnSpc>
+                <a:spcPct val="200000"/>
+              </a:lnSpc>
+            </a:pPr>
+            <a:r>
+              <a:rPr lang="en-US" dirty="0"/>
+              <a:t>Programming Languages</a:t>
+            </a:r>
+          </a:p>
+          <a:p>
+            <a:pPr lvl="1">
+              <a:lnSpc>
+                <a:spcPct val="200000"/>
+              </a:lnSpc>
+            </a:pPr>
+            <a:r>
+              <a:rPr lang="en-US" dirty="0"/>
+              <a:t>Java</a:t>
+            </a:r>
+          </a:p>
+          <a:p>
+            <a:pPr lvl="1">
+              <a:lnSpc>
+                <a:spcPct val="200000"/>
+              </a:lnSpc>
+            </a:pPr>
+            <a:r>
+              <a:rPr lang="en-US" dirty="0"/>
+              <a:t>Visual C# w/ .NET Framework 4.7.2</a:t>
+            </a:r>
+          </a:p>
+          <a:p>
+            <a:pPr lvl="1">
+              <a:lnSpc>
+                <a:spcPct val="200000"/>
+              </a:lnSpc>
+            </a:pPr>
+            <a:r>
+              <a:rPr lang="en-US" dirty="0"/>
+              <a:t>SQL</a:t>
+            </a:r>
+          </a:p>
+          <a:p>
+            <a:pPr lvl="1">
+              <a:lnSpc>
+                <a:spcPct val="200000"/>
+              </a:lnSpc>
+            </a:pPr>
+            <a:r>
+              <a:rPr lang="en-US" dirty="0"/>
+              <a:t>Bash Shell</a:t>
+            </a:r>
+          </a:p>
+        </p:txBody>
+      </p:sp>
+    </p:spTree>
+    <p:extLst>
+      <p:ext uri="{BB962C8B-B14F-4D97-AF65-F5344CB8AC3E}">
+        <p14:creationId xmlns:p14="http://schemas.microsoft.com/office/powerpoint/2010/main" val="2192283111"/>
+      </p:ext>
+    </p:extLst>
+  </p:cSld>
+  <p:clrMapOvr>
+    <a:masterClrMapping/>
+  </p:clrMapOvr>
+</p:sld>
+</file>
+
+<file path=ppt/slides/slide9.xml><?xml version="1.0" encoding="utf-8"?>
+<p:sld xmlns:a="http://schemas.openxmlformats.org/drawingml/2006/main" xmlns:r="http://schemas.openxmlformats.org/officeDocument/2006/relationships" xmlns:p="http://schemas.openxmlformats.org/presentationml/2006/main">
+  <p:cSld>
+    <p:spTree>
+      <p:nvGrpSpPr>
+        <p:cNvPr id="1" name=""/>
+        <p:cNvGrpSpPr/>
+        <p:nvPr/>
+      </p:nvGrpSpPr>
+      <p:grpSpPr>
+        <a:xfrm>
+          <a:off x="0" y="0"/>
+          <a:ext cx="0" cy="0"/>
+          <a:chOff x="0" y="0"/>
+          <a:chExt cx="0" cy="0"/>
+        </a:xfrm>
+      </p:grpSpPr>
+      <p:sp>
+        <p:nvSpPr>
+          <p:cNvPr id="2" name="Title 1">
+            <a:extLst>
+              <a:ext uri="{FF2B5EF4-FFF2-40B4-BE49-F238E27FC236}">
+                <a16:creationId xmlns:a16="http://schemas.microsoft.com/office/drawing/2014/main" id="{B8919540-A695-40ED-8B7B-A6CE76481DCE}"/>
+              </a:ext>
+            </a:extLst>
+          </p:cNvPr>
+          <p:cNvSpPr>
+            <a:spLocks noGrp="1"/>
+          </p:cNvSpPr>
+          <p:nvPr>
+            <p:ph type="title"/>
+          </p:nvPr>
+        </p:nvSpPr>
+        <p:spPr/>
+        <p:txBody>
+          <a:bodyPr/>
+          <a:lstStyle/>
+          <a:p>
+            <a:r>
+              <a:rPr lang="en-US" dirty="0"/>
+              <a:t>Tools</a:t>
+            </a:r>
+          </a:p>
+        </p:txBody>
+      </p:sp>
+      <p:sp>
+        <p:nvSpPr>
+          <p:cNvPr id="3" name="Content Placeholder 2">
+            <a:extLst>
+              <a:ext uri="{FF2B5EF4-FFF2-40B4-BE49-F238E27FC236}">
+                <a16:creationId xmlns:a16="http://schemas.microsoft.com/office/drawing/2014/main" id="{C33B223A-A423-4091-9F12-ED7C7275AF2E}"/>
+              </a:ext>
+            </a:extLst>
+          </p:cNvPr>
+          <p:cNvSpPr>
+            <a:spLocks noGrp="1"/>
+          </p:cNvSpPr>
+          <p:nvPr>
+            <p:ph idx="1"/>
+          </p:nvPr>
+        </p:nvSpPr>
+        <p:spPr/>
+        <p:txBody>
+          <a:bodyPr/>
+          <a:lstStyle/>
+          <a:p>
+            <a:pPr>
+              <a:lnSpc>
+                <a:spcPct val="150000"/>
+              </a:lnSpc>
+            </a:pPr>
+            <a:r>
+              <a:rPr lang="en-US" dirty="0"/>
+              <a:t>Networking Protocols</a:t>
+            </a:r>
+          </a:p>
+          <a:p>
+            <a:pPr lvl="1">
+              <a:lnSpc>
+                <a:spcPct val="150000"/>
+              </a:lnSpc>
+            </a:pPr>
+            <a:r>
+              <a:rPr lang="en-US" dirty="0"/>
+              <a:t>TCP/IP</a:t>
+            </a:r>
+          </a:p>
+          <a:p>
+            <a:pPr lvl="1">
+              <a:lnSpc>
+                <a:spcPct val="150000"/>
+              </a:lnSpc>
+            </a:pPr>
+            <a:r>
+              <a:rPr lang="en-US" dirty="0"/>
+              <a:t>Standard MySQL port: 3306</a:t>
+            </a:r>
+          </a:p>
+          <a:p>
+            <a:pPr lvl="1">
+              <a:lnSpc>
+                <a:spcPct val="150000"/>
+              </a:lnSpc>
+            </a:pPr>
+            <a:r>
+              <a:rPr lang="en-US" dirty="0"/>
+              <a:t>Java/C# .NET Sockets</a:t>
+            </a:r>
+          </a:p>
+          <a:p>
+            <a:pPr>
+              <a:lnSpc>
+                <a:spcPct val="150000"/>
+              </a:lnSpc>
+            </a:pPr>
+            <a:r>
+              <a:rPr lang="en-US" dirty="0"/>
+              <a:t>Database Connectivity</a:t>
+            </a:r>
+          </a:p>
+          <a:p>
+            <a:pPr lvl="1">
+              <a:lnSpc>
+                <a:spcPct val="150000"/>
+              </a:lnSpc>
+            </a:pPr>
+            <a:r>
+              <a:rPr lang="en-US" dirty="0"/>
+              <a:t>MySQL JDBC driver for Java</a:t>
+            </a:r>
+          </a:p>
+          <a:p>
+            <a:pPr lvl="1">
+              <a:lnSpc>
+                <a:spcPct val="150000"/>
+              </a:lnSpc>
+            </a:pPr>
+            <a:r>
+              <a:rPr lang="en-US" dirty="0"/>
+              <a:t>Database connectivity strictly server-side</a:t>
+            </a:r>
+          </a:p>
+        </p:txBody>
+      </p:sp>
+    </p:spTree>
+    <p:extLst>
+      <p:ext uri="{BB962C8B-B14F-4D97-AF65-F5344CB8AC3E}">
+        <p14:creationId xmlns:p14="http://schemas.microsoft.com/office/powerpoint/2010/main" val="1485893392"/>
       </p:ext>
     </p:extLst>
   </p:cSld>

</xml_diff>